<commit_message>
comparative analysis are added
</commit_message>
<xml_diff>
--- a/Weekly-Reports/StepwiseDesign.pptx
+++ b/Weekly-Reports/StepwiseDesign.pptx
@@ -260,7 +260,7 @@
           <a:p>
             <a:fld id="{F4F1A71A-9BFD-4E2F-8CB1-3FF418E5A8DE}" type="datetimeFigureOut">
               <a:rPr lang="sv-SE" smtClean="0"/>
-              <a:t>2023-06-05</a:t>
+              <a:t>2023-06-12</a:t>
             </a:fld>
             <a:endParaRPr lang="sv-SE"/>
           </a:p>
@@ -659,7 +659,7 @@
           <a:p>
             <a:fld id="{F1EF6EBA-2446-4F83-BF27-4368AC2AD5AA}" type="datetimeFigureOut">
               <a:rPr lang="sv-SE" smtClean="0"/>
-              <a:t>2023-06-05</a:t>
+              <a:t>2023-06-12</a:t>
             </a:fld>
             <a:endParaRPr lang="sv-SE"/>
           </a:p>
@@ -829,7 +829,7 @@
           <a:p>
             <a:fld id="{F1EF6EBA-2446-4F83-BF27-4368AC2AD5AA}" type="datetimeFigureOut">
               <a:rPr lang="sv-SE" smtClean="0"/>
-              <a:t>2023-06-05</a:t>
+              <a:t>2023-06-12</a:t>
             </a:fld>
             <a:endParaRPr lang="sv-SE"/>
           </a:p>
@@ -1009,7 +1009,7 @@
           <a:p>
             <a:fld id="{F1EF6EBA-2446-4F83-BF27-4368AC2AD5AA}" type="datetimeFigureOut">
               <a:rPr lang="sv-SE" smtClean="0"/>
-              <a:t>2023-06-05</a:t>
+              <a:t>2023-06-12</a:t>
             </a:fld>
             <a:endParaRPr lang="sv-SE"/>
           </a:p>
@@ -1179,7 +1179,7 @@
           <a:p>
             <a:fld id="{F1EF6EBA-2446-4F83-BF27-4368AC2AD5AA}" type="datetimeFigureOut">
               <a:rPr lang="sv-SE" smtClean="0"/>
-              <a:t>2023-06-05</a:t>
+              <a:t>2023-06-12</a:t>
             </a:fld>
             <a:endParaRPr lang="sv-SE"/>
           </a:p>
@@ -1425,7 +1425,7 @@
           <a:p>
             <a:fld id="{F1EF6EBA-2446-4F83-BF27-4368AC2AD5AA}" type="datetimeFigureOut">
               <a:rPr lang="sv-SE" smtClean="0"/>
-              <a:t>2023-06-05</a:t>
+              <a:t>2023-06-12</a:t>
             </a:fld>
             <a:endParaRPr lang="sv-SE"/>
           </a:p>
@@ -1657,7 +1657,7 @@
           <a:p>
             <a:fld id="{F1EF6EBA-2446-4F83-BF27-4368AC2AD5AA}" type="datetimeFigureOut">
               <a:rPr lang="sv-SE" smtClean="0"/>
-              <a:t>2023-06-05</a:t>
+              <a:t>2023-06-12</a:t>
             </a:fld>
             <a:endParaRPr lang="sv-SE"/>
           </a:p>
@@ -2024,7 +2024,7 @@
           <a:p>
             <a:fld id="{F1EF6EBA-2446-4F83-BF27-4368AC2AD5AA}" type="datetimeFigureOut">
               <a:rPr lang="sv-SE" smtClean="0"/>
-              <a:t>2023-06-05</a:t>
+              <a:t>2023-06-12</a:t>
             </a:fld>
             <a:endParaRPr lang="sv-SE"/>
           </a:p>
@@ -2142,7 +2142,7 @@
           <a:p>
             <a:fld id="{F1EF6EBA-2446-4F83-BF27-4368AC2AD5AA}" type="datetimeFigureOut">
               <a:rPr lang="sv-SE" smtClean="0"/>
-              <a:t>2023-06-05</a:t>
+              <a:t>2023-06-12</a:t>
             </a:fld>
             <a:endParaRPr lang="sv-SE"/>
           </a:p>
@@ -2237,7 +2237,7 @@
           <a:p>
             <a:fld id="{F1EF6EBA-2446-4F83-BF27-4368AC2AD5AA}" type="datetimeFigureOut">
               <a:rPr lang="sv-SE" smtClean="0"/>
-              <a:t>2023-06-05</a:t>
+              <a:t>2023-06-12</a:t>
             </a:fld>
             <a:endParaRPr lang="sv-SE"/>
           </a:p>
@@ -2514,7 +2514,7 @@
           <a:p>
             <a:fld id="{F1EF6EBA-2446-4F83-BF27-4368AC2AD5AA}" type="datetimeFigureOut">
               <a:rPr lang="sv-SE" smtClean="0"/>
-              <a:t>2023-06-05</a:t>
+              <a:t>2023-06-12</a:t>
             </a:fld>
             <a:endParaRPr lang="sv-SE"/>
           </a:p>
@@ -2767,7 +2767,7 @@
           <a:p>
             <a:fld id="{F1EF6EBA-2446-4F83-BF27-4368AC2AD5AA}" type="datetimeFigureOut">
               <a:rPr lang="sv-SE" smtClean="0"/>
-              <a:t>2023-06-05</a:t>
+              <a:t>2023-06-12</a:t>
             </a:fld>
             <a:endParaRPr lang="sv-SE"/>
           </a:p>
@@ -2980,7 +2980,7 @@
           <a:p>
             <a:fld id="{F1EF6EBA-2446-4F83-BF27-4368AC2AD5AA}" type="datetimeFigureOut">
               <a:rPr lang="sv-SE" smtClean="0"/>
-              <a:t>2023-06-05</a:t>
+              <a:t>2023-06-12</a:t>
             </a:fld>
             <a:endParaRPr lang="sv-SE"/>
           </a:p>
@@ -3466,21 +3466,8 @@
                   <a:srgbClr val="002060"/>
                 </a:solidFill>
               </a:rPr>
-              <a:t>Enes </a:t>
-            </a:r>
-            <a:r>
-              <a:rPr lang="en-US" dirty="0" smtClean="0">
-                <a:solidFill>
-                  <a:srgbClr val="002060"/>
-                </a:solidFill>
-              </a:rPr>
-              <a:t>Ayaz</a:t>
-            </a:r>
-            <a:endParaRPr lang="en-US" dirty="0" smtClean="0">
-              <a:solidFill>
-                <a:srgbClr val="002060"/>
-              </a:solidFill>
-            </a:endParaRPr>
+              <a:t>Enes Ayaz</a:t>
+            </a:r>
           </a:p>
         </p:txBody>
       </p:sp>

</xml_diff>